<commit_message>
Hd, screen docs corrections
</commit_message>
<xml_diff>
--- a/doc/www-hd.pptx
+++ b/doc/www-hd.pptx
@@ -8,7 +8,6 @@
     <p:sldId id="256" r:id="rId2"/>
     <p:sldId id="257" r:id="rId3"/>
     <p:sldId id="258" r:id="rId4"/>
-    <p:sldId id="260" r:id="rId5"/>
   </p:sldIdLst>
   <p:sldSz cx="9144000" cy="6858000" type="screen4x3"/>
   <p:notesSz cx="6858000" cy="9144000"/>
@@ -3038,65 +3037,11 @@
           <a:chExt cx="0" cy="0"/>
         </a:xfrm>
       </p:grpSpPr>
-      <p:sp>
-        <p:nvSpPr>
-          <p:cNvPr id="2" name="Title 1"/>
-          <p:cNvSpPr>
-            <a:spLocks noGrp="1"/>
-          </p:cNvSpPr>
-          <p:nvPr>
-            <p:ph type="ctrTitle"/>
-          </p:nvPr>
-        </p:nvSpPr>
-        <p:spPr>
-          <a:xfrm>
-            <a:off x="755576" y="3645024"/>
-            <a:ext cx="7772400" cy="1470025"/>
-          </a:xfrm>
-        </p:spPr>
-        <p:txBody>
-          <a:bodyPr>
-            <a:normAutofit/>
-          </a:bodyPr>
-          <a:lstStyle/>
-          <a:p>
-            <a:r>
-              <a:rPr lang="en-US" sz="8000" b="1" dirty="0" smtClean="0">
-                <a:solidFill>
-                  <a:srgbClr val="FF0000"/>
-                </a:solidFill>
-              </a:rPr>
-              <a:t>W</a:t>
-            </a:r>
-            <a:r>
-              <a:rPr lang="en-US" sz="8000" b="1" dirty="0" smtClean="0">
-                <a:solidFill>
-                  <a:srgbClr val="92D050"/>
-                </a:solidFill>
-              </a:rPr>
-              <a:t>W</a:t>
-            </a:r>
-            <a:r>
-              <a:rPr lang="en-US" sz="8000" b="1" dirty="0" smtClean="0">
-                <a:solidFill>
-                  <a:srgbClr val="002060"/>
-                </a:solidFill>
-              </a:rPr>
-              <a:t>W</a:t>
-            </a:r>
-            <a:endParaRPr lang="en-US" sz="8000" b="1" dirty="0">
-              <a:solidFill>
-                <a:srgbClr val="002060"/>
-              </a:solidFill>
-            </a:endParaRPr>
-          </a:p>
-        </p:txBody>
-      </p:sp>
       <p:pic>
         <p:nvPicPr>
-          <p:cNvPr id="8" name="Picture 2"/>
+          <p:cNvPr id="6" name="Picture 5"/>
           <p:cNvPicPr>
-            <a:picLocks noChangeAspect="1" noChangeArrowheads="1"/>
+            <a:picLocks noChangeAspect="1"/>
           </p:cNvPicPr>
           <p:nvPr/>
         </p:nvPicPr>
@@ -3108,52 +3053,18 @@
               </a:ext>
             </a:extLst>
           </a:blip>
-          <a:srcRect/>
           <a:stretch>
             <a:fillRect/>
           </a:stretch>
         </p:blipFill>
-        <p:spPr bwMode="auto">
+        <p:spPr>
           <a:xfrm>
-            <a:off x="3347864" y="1628800"/>
-            <a:ext cx="2279650" cy="1865313"/>
+            <a:off x="1979712" y="1340768"/>
+            <a:ext cx="4940925" cy="4017141"/>
           </a:xfrm>
           <a:prstGeom prst="rect">
             <a:avLst/>
           </a:prstGeom>
-          <a:noFill/>
-          <a:ln>
-            <a:noFill/>
-          </a:ln>
-          <a:effectLst/>
-          <a:extLst>
-            <a:ext uri="{909E8E84-426E-40DD-AFC4-6F175D3DCCD1}">
-              <a14:hiddenFill xmlns:a14="http://schemas.microsoft.com/office/drawing/2010/main">
-                <a:solidFill>
-                  <a:schemeClr val="accent1"/>
-                </a:solidFill>
-              </a14:hiddenFill>
-            </a:ext>
-            <a:ext uri="{91240B29-F687-4F45-9708-019B960494DF}">
-              <a14:hiddenLine xmlns:a14="http://schemas.microsoft.com/office/drawing/2010/main" w="9525">
-                <a:solidFill>
-                  <a:schemeClr val="tx1"/>
-                </a:solidFill>
-                <a:miter lim="800000"/>
-                <a:headEnd/>
-                <a:tailEnd/>
-              </a14:hiddenLine>
-            </a:ext>
-            <a:ext uri="{AF507438-7753-43E0-B8FC-AC1667EBCBE1}">
-              <a14:hiddenEffects xmlns:a14="http://schemas.microsoft.com/office/drawing/2010/main">
-                <a:effectLst>
-                  <a:outerShdw dist="35921" dir="2700000" algn="ctr" rotWithShape="0">
-                    <a:schemeClr val="bg2"/>
-                  </a:outerShdw>
-                </a:effectLst>
-              </a14:hiddenEffects>
-            </a:ext>
-          </a:extLst>
         </p:spPr>
       </p:pic>
     </p:spTree>
@@ -4780,465 +4691,6 @@
     <p:extLst>
       <p:ext uri="{BB962C8B-B14F-4D97-AF65-F5344CB8AC3E}">
         <p14:creationId xmlns:p14="http://schemas.microsoft.com/office/powerpoint/2010/main" val="3561813868"/>
-      </p:ext>
-    </p:extLst>
-  </p:cSld>
-  <p:clrMapOvr>
-    <a:masterClrMapping/>
-  </p:clrMapOvr>
-  <p:timing>
-    <p:tnLst>
-      <p:par>
-        <p:cTn id="1" dur="indefinite" restart="never" nodeType="tmRoot"/>
-      </p:par>
-    </p:tnLst>
-  </p:timing>
-</p:sld>
-</file>
-
-<file path=ppt/slides/slide4.xml><?xml version="1.0" encoding="utf-8"?>
-<p:sld xmlns:a="http://schemas.openxmlformats.org/drawingml/2006/main" xmlns:r="http://schemas.openxmlformats.org/officeDocument/2006/relationships" xmlns:p="http://schemas.openxmlformats.org/presentationml/2006/main">
-  <p:cSld>
-    <p:spTree>
-      <p:nvGrpSpPr>
-        <p:cNvPr id="1" name=""/>
-        <p:cNvGrpSpPr/>
-        <p:nvPr/>
-      </p:nvGrpSpPr>
-      <p:grpSpPr>
-        <a:xfrm>
-          <a:off x="0" y="0"/>
-          <a:ext cx="0" cy="0"/>
-          <a:chOff x="0" y="0"/>
-          <a:chExt cx="0" cy="0"/>
-        </a:xfrm>
-      </p:grpSpPr>
-      <p:sp>
-        <p:nvSpPr>
-          <p:cNvPr id="4" name="Rectangle 3"/>
-          <p:cNvSpPr/>
-          <p:nvPr/>
-        </p:nvSpPr>
-        <p:spPr>
-          <a:xfrm>
-            <a:off x="1936798" y="2942084"/>
-            <a:ext cx="797382" cy="923330"/>
-          </a:xfrm>
-          <a:prstGeom prst="rect">
-            <a:avLst/>
-          </a:prstGeom>
-          <a:noFill/>
-        </p:spPr>
-        <p:txBody>
-          <a:bodyPr wrap="square" lIns="91440" tIns="45720" rIns="91440" bIns="45720">
-            <a:spAutoFit/>
-            <a:scene3d>
-              <a:camera prst="orthographicFront"/>
-              <a:lightRig rig="flat" dir="tl">
-                <a:rot lat="0" lon="0" rev="6600000"/>
-              </a:lightRig>
-            </a:scene3d>
-            <a:sp3d extrusionH="25400" contourW="8890">
-              <a:bevelT w="38100" h="31750"/>
-              <a:contourClr>
-                <a:schemeClr val="accent2">
-                  <a:shade val="75000"/>
-                </a:schemeClr>
-              </a:contourClr>
-            </a:sp3d>
-          </a:bodyPr>
-          <a:lstStyle/>
-          <a:p>
-            <a:pPr algn="ctr"/>
-            <a:r>
-              <a:rPr lang="en-US" sz="5400" b="1" cap="none" spc="0" dirty="0" smtClean="0">
-                <a:ln w="11430"/>
-                <a:gradFill>
-                  <a:gsLst>
-                    <a:gs pos="0">
-                      <a:schemeClr val="accent2">
-                        <a:tint val="70000"/>
-                        <a:satMod val="245000"/>
-                      </a:schemeClr>
-                    </a:gs>
-                    <a:gs pos="75000">
-                      <a:schemeClr val="accent2">
-                        <a:tint val="90000"/>
-                        <a:shade val="60000"/>
-                        <a:satMod val="240000"/>
-                      </a:schemeClr>
-                    </a:gs>
-                    <a:gs pos="100000">
-                      <a:schemeClr val="accent2">
-                        <a:tint val="100000"/>
-                        <a:shade val="50000"/>
-                        <a:satMod val="240000"/>
-                      </a:schemeClr>
-                    </a:gs>
-                  </a:gsLst>
-                  <a:lin ang="5400000"/>
-                </a:gradFill>
-                <a:effectLst>
-                  <a:outerShdw blurRad="50800" dist="39000" dir="5460000" algn="tl">
-                    <a:srgbClr val="000000">
-                      <a:alpha val="38000"/>
-                    </a:srgbClr>
-                  </a:outerShdw>
-                </a:effectLst>
-                <a:latin typeface="Harrington" pitchFamily="82" charset="0"/>
-              </a:rPr>
-              <a:t>W</a:t>
-            </a:r>
-            <a:endParaRPr lang="en-US" sz="5400" b="1" cap="none" spc="0" dirty="0">
-              <a:ln w="11430"/>
-              <a:gradFill>
-                <a:gsLst>
-                  <a:gs pos="0">
-                    <a:schemeClr val="accent2">
-                      <a:tint val="70000"/>
-                      <a:satMod val="245000"/>
-                    </a:schemeClr>
-                  </a:gs>
-                  <a:gs pos="75000">
-                    <a:schemeClr val="accent2">
-                      <a:tint val="90000"/>
-                      <a:shade val="60000"/>
-                      <a:satMod val="240000"/>
-                    </a:schemeClr>
-                  </a:gs>
-                  <a:gs pos="100000">
-                    <a:schemeClr val="accent2">
-                      <a:tint val="100000"/>
-                      <a:shade val="50000"/>
-                      <a:satMod val="240000"/>
-                    </a:schemeClr>
-                  </a:gs>
-                </a:gsLst>
-                <a:lin ang="5400000"/>
-              </a:gradFill>
-              <a:effectLst>
-                <a:outerShdw blurRad="50800" dist="39000" dir="5460000" algn="tl">
-                  <a:srgbClr val="000000">
-                    <a:alpha val="38000"/>
-                  </a:srgbClr>
-                </a:outerShdw>
-              </a:effectLst>
-              <a:latin typeface="Harrington" pitchFamily="82" charset="0"/>
-            </a:endParaRPr>
-          </a:p>
-        </p:txBody>
-      </p:sp>
-      <p:sp>
-        <p:nvSpPr>
-          <p:cNvPr id="5" name="Rectangle 4"/>
-          <p:cNvSpPr/>
-          <p:nvPr/>
-        </p:nvSpPr>
-        <p:spPr>
-          <a:xfrm>
-            <a:off x="2307446" y="2942084"/>
-            <a:ext cx="797382" cy="923330"/>
-          </a:xfrm>
-          <a:prstGeom prst="rect">
-            <a:avLst/>
-          </a:prstGeom>
-          <a:noFill/>
-        </p:spPr>
-        <p:txBody>
-          <a:bodyPr wrap="square" lIns="91440" tIns="45720" rIns="91440" bIns="45720">
-            <a:spAutoFit/>
-            <a:scene3d>
-              <a:camera prst="orthographicFront"/>
-              <a:lightRig rig="flat" dir="tl">
-                <a:rot lat="0" lon="0" rev="6600000"/>
-              </a:lightRig>
-            </a:scene3d>
-            <a:sp3d extrusionH="25400" contourW="8890">
-              <a:bevelT w="38100" h="31750"/>
-              <a:contourClr>
-                <a:schemeClr val="accent2">
-                  <a:shade val="75000"/>
-                </a:schemeClr>
-              </a:contourClr>
-            </a:sp3d>
-          </a:bodyPr>
-          <a:lstStyle/>
-          <a:p>
-            <a:pPr algn="ctr"/>
-            <a:r>
-              <a:rPr lang="en-US" sz="5400" b="1" cap="none" spc="0" dirty="0" smtClean="0">
-                <a:ln w="11430"/>
-                <a:solidFill>
-                  <a:srgbClr val="92D050"/>
-                </a:solidFill>
-                <a:effectLst>
-                  <a:outerShdw blurRad="50800" dist="39000" dir="5460000" algn="tl">
-                    <a:srgbClr val="000000">
-                      <a:alpha val="38000"/>
-                    </a:srgbClr>
-                  </a:outerShdw>
-                </a:effectLst>
-                <a:latin typeface="Harrington" pitchFamily="82" charset="0"/>
-              </a:rPr>
-              <a:t>W</a:t>
-            </a:r>
-            <a:endParaRPr lang="en-US" sz="5400" b="1" cap="none" spc="0" dirty="0">
-              <a:ln w="11430"/>
-              <a:solidFill>
-                <a:srgbClr val="92D050"/>
-              </a:solidFill>
-              <a:effectLst>
-                <a:outerShdw blurRad="50800" dist="39000" dir="5460000" algn="tl">
-                  <a:srgbClr val="000000">
-                    <a:alpha val="38000"/>
-                  </a:srgbClr>
-                </a:outerShdw>
-              </a:effectLst>
-              <a:latin typeface="Harrington" pitchFamily="82" charset="0"/>
-            </a:endParaRPr>
-          </a:p>
-        </p:txBody>
-      </p:sp>
-      <p:sp>
-        <p:nvSpPr>
-          <p:cNvPr id="6" name="Rectangle 5"/>
-          <p:cNvSpPr/>
-          <p:nvPr/>
-        </p:nvSpPr>
-        <p:spPr>
-          <a:xfrm>
-            <a:off x="2678086" y="2945631"/>
-            <a:ext cx="797382" cy="923330"/>
-          </a:xfrm>
-          <a:prstGeom prst="rect">
-            <a:avLst/>
-          </a:prstGeom>
-          <a:noFill/>
-        </p:spPr>
-        <p:txBody>
-          <a:bodyPr wrap="square" lIns="91440" tIns="45720" rIns="91440" bIns="45720">
-            <a:spAutoFit/>
-            <a:scene3d>
-              <a:camera prst="orthographicFront"/>
-              <a:lightRig rig="flat" dir="tl">
-                <a:rot lat="0" lon="0" rev="6600000"/>
-              </a:lightRig>
-            </a:scene3d>
-            <a:sp3d extrusionH="25400" contourW="8890">
-              <a:bevelT w="38100" h="31750"/>
-              <a:contourClr>
-                <a:schemeClr val="accent2">
-                  <a:shade val="75000"/>
-                </a:schemeClr>
-              </a:contourClr>
-            </a:sp3d>
-          </a:bodyPr>
-          <a:lstStyle/>
-          <a:p>
-            <a:pPr algn="ctr"/>
-            <a:r>
-              <a:rPr lang="en-US" sz="5400" b="1" cap="none" spc="0" dirty="0" smtClean="0">
-                <a:ln w="11430"/>
-                <a:solidFill>
-                  <a:srgbClr val="7030A0"/>
-                </a:solidFill>
-                <a:effectLst>
-                  <a:outerShdw blurRad="50800" dist="39000" dir="5460000" algn="tl">
-                    <a:srgbClr val="000000">
-                      <a:alpha val="38000"/>
-                    </a:srgbClr>
-                  </a:outerShdw>
-                </a:effectLst>
-                <a:latin typeface="Harrington" pitchFamily="82" charset="0"/>
-              </a:rPr>
-              <a:t>W</a:t>
-            </a:r>
-            <a:endParaRPr lang="en-US" sz="5400" b="1" cap="none" spc="0" dirty="0">
-              <a:ln w="11430"/>
-              <a:solidFill>
-                <a:srgbClr val="7030A0"/>
-              </a:solidFill>
-              <a:effectLst>
-                <a:outerShdw blurRad="50800" dist="39000" dir="5460000" algn="tl">
-                  <a:srgbClr val="000000">
-                    <a:alpha val="38000"/>
-                  </a:srgbClr>
-                </a:outerShdw>
-              </a:effectLst>
-              <a:latin typeface="Harrington" pitchFamily="82" charset="0"/>
-            </a:endParaRPr>
-          </a:p>
-        </p:txBody>
-      </p:sp>
-      <p:sp>
-        <p:nvSpPr>
-          <p:cNvPr id="7" name="Block Arc 6"/>
-          <p:cNvSpPr/>
-          <p:nvPr/>
-        </p:nvSpPr>
-        <p:spPr>
-          <a:xfrm>
-            <a:off x="1763688" y="2492896"/>
-            <a:ext cx="1828800" cy="1828800"/>
-          </a:xfrm>
-          <a:prstGeom prst="blockArc">
-            <a:avLst>
-              <a:gd name="adj1" fmla="val 12242566"/>
-              <a:gd name="adj2" fmla="val 9653"/>
-              <a:gd name="adj3" fmla="val 4989"/>
-            </a:avLst>
-          </a:prstGeom>
-          <a:solidFill>
-            <a:srgbClr val="FF0000"/>
-          </a:solidFill>
-          <a:ln>
-            <a:solidFill>
-              <a:srgbClr val="FF0000"/>
-            </a:solidFill>
-          </a:ln>
-        </p:spPr>
-        <p:style>
-          <a:lnRef idx="2">
-            <a:schemeClr val="accent1">
-              <a:shade val="50000"/>
-            </a:schemeClr>
-          </a:lnRef>
-          <a:fillRef idx="1">
-            <a:schemeClr val="accent1"/>
-          </a:fillRef>
-          <a:effectRef idx="0">
-            <a:schemeClr val="accent1"/>
-          </a:effectRef>
-          <a:fontRef idx="minor">
-            <a:schemeClr val="lt1"/>
-          </a:fontRef>
-        </p:style>
-        <p:txBody>
-          <a:bodyPr rtlCol="0" anchor="ctr"/>
-          <a:lstStyle/>
-          <a:p>
-            <a:pPr algn="ctr"/>
-            <a:endParaRPr lang="en-US">
-              <a:solidFill>
-                <a:schemeClr val="tx1"/>
-              </a:solidFill>
-            </a:endParaRPr>
-          </a:p>
-        </p:txBody>
-      </p:sp>
-      <p:sp>
-        <p:nvSpPr>
-          <p:cNvPr id="8" name="Block Arc 7"/>
-          <p:cNvSpPr/>
-          <p:nvPr/>
-        </p:nvSpPr>
-        <p:spPr>
-          <a:xfrm rot="12252871">
-            <a:off x="1763688" y="2492896"/>
-            <a:ext cx="1828800" cy="1828800"/>
-          </a:xfrm>
-          <a:prstGeom prst="blockArc">
-            <a:avLst>
-              <a:gd name="adj1" fmla="val 10826306"/>
-              <a:gd name="adj2" fmla="val 9653"/>
-              <a:gd name="adj3" fmla="val 4989"/>
-            </a:avLst>
-          </a:prstGeom>
-          <a:ln>
-            <a:solidFill>
-              <a:srgbClr val="0070C0"/>
-            </a:solidFill>
-          </a:ln>
-        </p:spPr>
-        <p:style>
-          <a:lnRef idx="2">
-            <a:schemeClr val="accent1">
-              <a:shade val="50000"/>
-            </a:schemeClr>
-          </a:lnRef>
-          <a:fillRef idx="1">
-            <a:schemeClr val="accent1"/>
-          </a:fillRef>
-          <a:effectRef idx="0">
-            <a:schemeClr val="accent1"/>
-          </a:effectRef>
-          <a:fontRef idx="minor">
-            <a:schemeClr val="lt1"/>
-          </a:fontRef>
-        </p:style>
-        <p:txBody>
-          <a:bodyPr rtlCol="0" anchor="ctr"/>
-          <a:lstStyle/>
-          <a:p>
-            <a:pPr algn="ctr"/>
-            <a:endParaRPr lang="en-US">
-              <a:solidFill>
-                <a:schemeClr val="tx1"/>
-              </a:solidFill>
-            </a:endParaRPr>
-          </a:p>
-        </p:txBody>
-      </p:sp>
-      <p:sp>
-        <p:nvSpPr>
-          <p:cNvPr id="9" name="Block Arc 8"/>
-          <p:cNvSpPr/>
-          <p:nvPr/>
-        </p:nvSpPr>
-        <p:spPr>
-          <a:xfrm rot="4469485">
-            <a:off x="1763686" y="2492896"/>
-            <a:ext cx="1828800" cy="1828800"/>
-          </a:xfrm>
-          <a:prstGeom prst="blockArc">
-            <a:avLst>
-              <a:gd name="adj1" fmla="val 15734936"/>
-              <a:gd name="adj2" fmla="val 1028805"/>
-              <a:gd name="adj3" fmla="val 5187"/>
-            </a:avLst>
-          </a:prstGeom>
-          <a:solidFill>
-            <a:srgbClr val="92D050"/>
-          </a:solidFill>
-          <a:ln>
-            <a:solidFill>
-              <a:srgbClr val="92D050"/>
-            </a:solidFill>
-          </a:ln>
-        </p:spPr>
-        <p:style>
-          <a:lnRef idx="2">
-            <a:schemeClr val="accent1">
-              <a:shade val="50000"/>
-            </a:schemeClr>
-          </a:lnRef>
-          <a:fillRef idx="1">
-            <a:schemeClr val="accent1"/>
-          </a:fillRef>
-          <a:effectRef idx="0">
-            <a:schemeClr val="accent1"/>
-          </a:effectRef>
-          <a:fontRef idx="minor">
-            <a:schemeClr val="lt1"/>
-          </a:fontRef>
-        </p:style>
-        <p:txBody>
-          <a:bodyPr rtlCol="0" anchor="ctr"/>
-          <a:lstStyle/>
-          <a:p>
-            <a:pPr algn="ctr"/>
-            <a:endParaRPr lang="en-US">
-              <a:solidFill>
-                <a:schemeClr val="tx1"/>
-              </a:solidFill>
-            </a:endParaRPr>
-          </a:p>
-        </p:txBody>
-      </p:sp>
-    </p:spTree>
-    <p:extLst>
-      <p:ext uri="{BB962C8B-B14F-4D97-AF65-F5344CB8AC3E}">
-        <p14:creationId xmlns:p14="http://schemas.microsoft.com/office/powerpoint/2010/main" val="749434029"/>
       </p:ext>
     </p:extLst>
   </p:cSld>

</xml_diff>